<commit_message>
Updated project request template
</commit_message>
<xml_diff>
--- a/project_request_template.pptx
+++ b/project_request_template.pptx
@@ -265,7 +265,7 @@
             <a:fld id="{0DAB70E3-47D6-2842-9376-028C836601F0}" type="datetimeFigureOut">
               <a:rPr lang="en-US" smtClean="0"/>
               <a:pPr/>
-              <a:t>12/4/19</a:t>
+              <a:t>12/19/19</a:t>
             </a:fld>
             <a:endParaRPr lang="en-US" dirty="0"/>
           </a:p>
@@ -475,7 +475,7 @@
           <a:p>
             <a:fld id="{0DAB70E3-47D6-2842-9376-028C836601F0}" type="datetimeFigureOut">
               <a:rPr lang="en-US" smtClean="0"/>
-              <a:t>12/4/19</a:t>
+              <a:t>12/19/19</a:t>
             </a:fld>
             <a:endParaRPr lang="en-US"/>
           </a:p>
@@ -1665,8 +1665,8 @@
         </p:nvSpPr>
         <p:spPr>
           <a:xfrm>
-            <a:off x="3772465" y="0"/>
-            <a:ext cx="3084969" cy="155121"/>
+            <a:off x="4918840" y="0"/>
+            <a:ext cx="1938593" cy="184666"/>
           </a:xfrm>
           <a:ln>
             <a:noFill/>
@@ -2031,7 +2031,7 @@
           <a:p>
             <a:fld id="{0DAB70E3-47D6-2842-9376-028C836601F0}" type="datetimeFigureOut">
               <a:rPr lang="en-US" smtClean="0"/>
-              <a:t>12/4/19</a:t>
+              <a:t>12/19/19</a:t>
             </a:fld>
             <a:endParaRPr lang="en-US"/>
           </a:p>
@@ -2854,7 +2854,7 @@
 </file>
 
 <file path=ppt/slideLayouts/slideLayout4.xml><?xml version="1.0" encoding="utf-8"?>
-<p:sldLayout xmlns:a="http://schemas.openxmlformats.org/drawingml/2006/main" xmlns:r="http://schemas.openxmlformats.org/officeDocument/2006/relationships" xmlns:p="http://schemas.openxmlformats.org/presentationml/2006/main" preserve="1" userDrawn="1">
+<p:sldLayout xmlns:a="http://schemas.openxmlformats.org/drawingml/2006/main" xmlns:r="http://schemas.openxmlformats.org/officeDocument/2006/relationships" xmlns:p="http://schemas.openxmlformats.org/presentationml/2006/main" showMasterSp="0" preserve="1" userDrawn="1">
   <p:cSld name="3_Title and Content">
     <p:spTree>
       <p:nvGrpSpPr>
@@ -2882,7 +2882,7 @@
         </p:nvSpPr>
         <p:spPr>
           <a:xfrm>
-            <a:off x="208876" y="3220497"/>
+            <a:off x="208876" y="3346617"/>
             <a:ext cx="6391748" cy="2286000"/>
           </a:xfrm>
           <a:ln>
@@ -2959,76 +2959,6 @@
       </p:sp>
       <p:sp>
         <p:nvSpPr>
-          <p:cNvPr id="4" name="Date Placeholder 3"/>
-          <p:cNvSpPr>
-            <a:spLocks noGrp="1"/>
-          </p:cNvSpPr>
-          <p:nvPr>
-            <p:ph type="dt" sz="half" idx="10"/>
-          </p:nvPr>
-        </p:nvSpPr>
-        <p:spPr/>
-        <p:txBody>
-          <a:bodyPr/>
-          <a:lstStyle/>
-          <a:p>
-            <a:fld id="{0DAB70E3-47D6-2842-9376-028C836601F0}" type="datetimeFigureOut">
-              <a:rPr lang="en-US" smtClean="0"/>
-              <a:t>12/4/19</a:t>
-            </a:fld>
-            <a:endParaRPr lang="en-US"/>
-          </a:p>
-        </p:txBody>
-      </p:sp>
-      <p:sp>
-        <p:nvSpPr>
-          <p:cNvPr id="5" name="Footer Placeholder 4"/>
-          <p:cNvSpPr>
-            <a:spLocks noGrp="1"/>
-          </p:cNvSpPr>
-          <p:nvPr>
-            <p:ph type="ftr" sz="quarter" idx="11"/>
-          </p:nvPr>
-        </p:nvSpPr>
-        <p:spPr>
-          <a:xfrm>
-            <a:off x="1543050" y="8947282"/>
-            <a:ext cx="3771900" cy="196718"/>
-          </a:xfrm>
-        </p:spPr>
-        <p:txBody>
-          <a:bodyPr/>
-          <a:lstStyle/>
-          <a:p>
-            <a:endParaRPr lang="en-US"/>
-          </a:p>
-        </p:txBody>
-      </p:sp>
-      <p:sp>
-        <p:nvSpPr>
-          <p:cNvPr id="6" name="Slide Number Placeholder 5"/>
-          <p:cNvSpPr>
-            <a:spLocks noGrp="1"/>
-          </p:cNvSpPr>
-          <p:nvPr>
-            <p:ph type="sldNum" sz="quarter" idx="12"/>
-          </p:nvPr>
-        </p:nvSpPr>
-        <p:spPr/>
-        <p:txBody>
-          <a:bodyPr/>
-          <a:lstStyle/>
-          <a:p>
-            <a:fld id="{EBDA84D8-2017-D642-A480-A65A29EB22F2}" type="slidenum">
-              <a:rPr lang="en-US" smtClean="0"/>
-              <a:t>‹#›</a:t>
-            </a:fld>
-            <a:endParaRPr lang="en-US"/>
-          </a:p>
-        </p:txBody>
-      </p:sp>
-      <p:sp>
-        <p:nvSpPr>
           <p:cNvPr id="7" name="TextBox 6">
             <a:extLst>
               <a:ext uri="{FF2B5EF4-FFF2-40B4-BE49-F238E27FC236}">
@@ -3057,7 +2987,7 @@
           <a:p>
             <a:r>
               <a:rPr lang="en-US" sz="1200" dirty="0"/>
-              <a:t>Project Proposal</a:t>
+              <a:t>Project Request</a:t>
             </a:r>
           </a:p>
         </p:txBody>
@@ -3076,7 +3006,7 @@
         </p:nvSpPr>
         <p:spPr>
           <a:xfrm>
-            <a:off x="3445263" y="1190419"/>
+            <a:off x="3482585" y="1987742"/>
             <a:ext cx="641201" cy="215444"/>
           </a:xfrm>
           <a:prstGeom prst="rect">
@@ -3093,41 +3023,6 @@
             <a:r>
               <a:rPr lang="en-US" sz="1400" dirty="0"/>
               <a:t>Sponsor:</a:t>
-            </a:r>
-          </a:p>
-        </p:txBody>
-      </p:sp>
-      <p:sp>
-        <p:nvSpPr>
-          <p:cNvPr id="26" name="TextBox 25">
-            <a:extLst>
-              <a:ext uri="{FF2B5EF4-FFF2-40B4-BE49-F238E27FC236}">
-                <a16:creationId xmlns:a16="http://schemas.microsoft.com/office/drawing/2014/main" id="{A21965D0-D0BC-1842-9828-B55851720F3C}"/>
-              </a:ext>
-            </a:extLst>
-          </p:cNvPr>
-          <p:cNvSpPr txBox="1"/>
-          <p:nvPr userDrawn="1"/>
-        </p:nvSpPr>
-        <p:spPr>
-          <a:xfrm>
-            <a:off x="3425412" y="1556938"/>
-            <a:ext cx="1262012" cy="215444"/>
-          </a:xfrm>
-          <a:prstGeom prst="rect">
-            <a:avLst/>
-          </a:prstGeom>
-          <a:noFill/>
-        </p:spPr>
-        <p:txBody>
-          <a:bodyPr wrap="none" lIns="0" tIns="0" rIns="0" bIns="0" rtlCol="0">
-            <a:spAutoFit/>
-          </a:bodyPr>
-          <a:lstStyle/>
-          <a:p>
-            <a:r>
-              <a:rPr lang="en-US" sz="1400" dirty="0"/>
-              <a:t>Project Manager:</a:t>
             </a:r>
           </a:p>
         </p:txBody>
@@ -3150,7 +3045,7 @@
         </p:nvSpPr>
         <p:spPr>
           <a:xfrm>
-            <a:off x="4687424" y="1156518"/>
+            <a:off x="4714236" y="1953841"/>
             <a:ext cx="1896644" cy="277812"/>
           </a:xfrm>
           <a:ln>
@@ -3182,10 +3077,45 @@
       </p:sp>
       <p:sp>
         <p:nvSpPr>
-          <p:cNvPr id="29" name="Text Placeholder 12">
-            <a:extLst>
-              <a:ext uri="{FF2B5EF4-FFF2-40B4-BE49-F238E27FC236}">
-                <a16:creationId xmlns:a16="http://schemas.microsoft.com/office/drawing/2014/main" id="{400E478C-4BCC-1D44-BE7C-FD045E36B514}"/>
+          <p:cNvPr id="31" name="TextBox 30">
+            <a:extLst>
+              <a:ext uri="{FF2B5EF4-FFF2-40B4-BE49-F238E27FC236}">
+                <a16:creationId xmlns:a16="http://schemas.microsoft.com/office/drawing/2014/main" id="{8E9922DA-7217-2141-90B9-402FC8B598D1}"/>
+              </a:ext>
+            </a:extLst>
+          </p:cNvPr>
+          <p:cNvSpPr txBox="1"/>
+          <p:nvPr userDrawn="1"/>
+        </p:nvSpPr>
+        <p:spPr>
+          <a:xfrm>
+            <a:off x="3483278" y="2362605"/>
+            <a:ext cx="1090042" cy="215444"/>
+          </a:xfrm>
+          <a:prstGeom prst="rect">
+            <a:avLst/>
+          </a:prstGeom>
+          <a:noFill/>
+        </p:spPr>
+        <p:txBody>
+          <a:bodyPr wrap="none" lIns="0" tIns="0" rIns="0" bIns="0" rtlCol="0">
+            <a:spAutoFit/>
+          </a:bodyPr>
+          <a:lstStyle/>
+          <a:p>
+            <a:r>
+              <a:rPr lang="en-US" sz="1400" dirty="0"/>
+              <a:t>Business Lines:</a:t>
+            </a:r>
+          </a:p>
+        </p:txBody>
+      </p:sp>
+      <p:sp>
+        <p:nvSpPr>
+          <p:cNvPr id="32" name="Text Placeholder 12">
+            <a:extLst>
+              <a:ext uri="{FF2B5EF4-FFF2-40B4-BE49-F238E27FC236}">
+                <a16:creationId xmlns:a16="http://schemas.microsoft.com/office/drawing/2014/main" id="{0F777A8B-99F0-E949-AAA0-FDF091A84688}"/>
               </a:ext>
             </a:extLst>
           </p:cNvPr>
@@ -3193,13 +3123,13 @@
             <a:spLocks noGrp="1"/>
           </p:cNvSpPr>
           <p:nvPr>
-            <p:ph type="body" sz="quarter" idx="20"/>
+            <p:ph type="body" sz="quarter" idx="21"/>
           </p:nvPr>
         </p:nvSpPr>
         <p:spPr>
           <a:xfrm>
-            <a:off x="4687424" y="1529592"/>
-            <a:ext cx="1896644" cy="277812"/>
+            <a:off x="4709743" y="2329284"/>
+            <a:ext cx="1896643" cy="277812"/>
           </a:xfrm>
           <a:ln>
             <a:solidFill>
@@ -3216,7 +3146,7 @@
           <a:lstStyle>
             <a:lvl1pPr marL="0" indent="0" algn="l">
               <a:buNone/>
-              <a:defRPr sz="1200"/>
+              <a:defRPr sz="1050"/>
             </a:lvl1pPr>
           </a:lstStyle>
           <a:p>
@@ -3230,10 +3160,10 @@
       </p:sp>
       <p:sp>
         <p:nvSpPr>
-          <p:cNvPr id="31" name="TextBox 30">
-            <a:extLst>
-              <a:ext uri="{FF2B5EF4-FFF2-40B4-BE49-F238E27FC236}">
-                <a16:creationId xmlns:a16="http://schemas.microsoft.com/office/drawing/2014/main" id="{8E9922DA-7217-2141-90B9-402FC8B598D1}"/>
+          <p:cNvPr id="33" name="TextBox 32">
+            <a:extLst>
+              <a:ext uri="{FF2B5EF4-FFF2-40B4-BE49-F238E27FC236}">
+                <a16:creationId xmlns:a16="http://schemas.microsoft.com/office/drawing/2014/main" id="{54515B47-A7C3-BB49-B87C-B01BB10685A5}"/>
               </a:ext>
             </a:extLst>
           </p:cNvPr>
@@ -3242,8 +3172,8 @@
         </p:nvSpPr>
         <p:spPr>
           <a:xfrm>
-            <a:off x="3483278" y="2131383"/>
-            <a:ext cx="1189428" cy="184666"/>
+            <a:off x="227269" y="2383104"/>
+            <a:ext cx="486352" cy="215444"/>
           </a:xfrm>
           <a:prstGeom prst="rect">
             <a:avLst/>
@@ -3257,18 +3187,22 @@
           <a:lstStyle/>
           <a:p>
             <a:r>
+              <a:rPr lang="en-US" sz="1400" dirty="0"/>
+              <a:t>States</a:t>
+            </a:r>
+            <a:r>
               <a:rPr lang="en-US" sz="1200" dirty="0"/>
-              <a:t>Line(s) of Business:</a:t>
-            </a:r>
-          </a:p>
-        </p:txBody>
-      </p:sp>
-      <p:sp>
-        <p:nvSpPr>
-          <p:cNvPr id="32" name="Text Placeholder 12">
-            <a:extLst>
-              <a:ext uri="{FF2B5EF4-FFF2-40B4-BE49-F238E27FC236}">
-                <a16:creationId xmlns:a16="http://schemas.microsoft.com/office/drawing/2014/main" id="{0F777A8B-99F0-E949-AAA0-FDF091A84688}"/>
+              <a:t>:</a:t>
+            </a:r>
+          </a:p>
+        </p:txBody>
+      </p:sp>
+      <p:sp>
+        <p:nvSpPr>
+          <p:cNvPr id="34" name="Text Placeholder 12">
+            <a:extLst>
+              <a:ext uri="{FF2B5EF4-FFF2-40B4-BE49-F238E27FC236}">
+                <a16:creationId xmlns:a16="http://schemas.microsoft.com/office/drawing/2014/main" id="{B4A5FE30-83C1-F345-AFBD-078FAF907E14}"/>
               </a:ext>
             </a:extLst>
           </p:cNvPr>
@@ -3276,13 +3210,13 @@
             <a:spLocks noGrp="1"/>
           </p:cNvSpPr>
           <p:nvPr>
-            <p:ph type="body" sz="quarter" idx="21"/>
+            <p:ph type="body" sz="quarter" idx="22"/>
           </p:nvPr>
         </p:nvSpPr>
         <p:spPr>
           <a:xfrm>
-            <a:off x="4791123" y="2098062"/>
-            <a:ext cx="1815263" cy="277812"/>
+            <a:off x="1283447" y="2336531"/>
+            <a:ext cx="2064175" cy="277812"/>
           </a:xfrm>
           <a:ln>
             <a:solidFill>
@@ -3311,89 +3245,6 @@
           </a:p>
         </p:txBody>
       </p:sp>
-      <p:sp>
-        <p:nvSpPr>
-          <p:cNvPr id="33" name="TextBox 32">
-            <a:extLst>
-              <a:ext uri="{FF2B5EF4-FFF2-40B4-BE49-F238E27FC236}">
-                <a16:creationId xmlns:a16="http://schemas.microsoft.com/office/drawing/2014/main" id="{54515B47-A7C3-BB49-B87C-B01BB10685A5}"/>
-              </a:ext>
-            </a:extLst>
-          </p:cNvPr>
-          <p:cNvSpPr txBox="1"/>
-          <p:nvPr userDrawn="1"/>
-        </p:nvSpPr>
-        <p:spPr>
-          <a:xfrm>
-            <a:off x="227269" y="2151882"/>
-            <a:ext cx="421462" cy="184666"/>
-          </a:xfrm>
-          <a:prstGeom prst="rect">
-            <a:avLst/>
-          </a:prstGeom>
-          <a:noFill/>
-        </p:spPr>
-        <p:txBody>
-          <a:bodyPr wrap="none" lIns="0" tIns="0" rIns="0" bIns="0" rtlCol="0">
-            <a:spAutoFit/>
-          </a:bodyPr>
-          <a:lstStyle/>
-          <a:p>
-            <a:r>
-              <a:rPr lang="en-US" sz="1200" dirty="0"/>
-              <a:t>States:</a:t>
-            </a:r>
-          </a:p>
-        </p:txBody>
-      </p:sp>
-      <p:sp>
-        <p:nvSpPr>
-          <p:cNvPr id="34" name="Text Placeholder 12">
-            <a:extLst>
-              <a:ext uri="{FF2B5EF4-FFF2-40B4-BE49-F238E27FC236}">
-                <a16:creationId xmlns:a16="http://schemas.microsoft.com/office/drawing/2014/main" id="{B4A5FE30-83C1-F345-AFBD-078FAF907E14}"/>
-              </a:ext>
-            </a:extLst>
-          </p:cNvPr>
-          <p:cNvSpPr>
-            <a:spLocks noGrp="1"/>
-          </p:cNvSpPr>
-          <p:nvPr>
-            <p:ph type="body" sz="quarter" idx="22"/>
-          </p:nvPr>
-        </p:nvSpPr>
-        <p:spPr>
-          <a:xfrm>
-            <a:off x="1532359" y="2105309"/>
-            <a:ext cx="1815263" cy="277812"/>
-          </a:xfrm>
-          <a:ln>
-            <a:solidFill>
-              <a:schemeClr val="bg2">
-                <a:lumMod val="90000"/>
-              </a:schemeClr>
-            </a:solidFill>
-          </a:ln>
-        </p:spPr>
-        <p:txBody>
-          <a:bodyPr anchor="ctr">
-            <a:noAutofit/>
-          </a:bodyPr>
-          <a:lstStyle>
-            <a:lvl1pPr marL="0" indent="0" algn="l">
-              <a:buNone/>
-              <a:defRPr sz="1050"/>
-            </a:lvl1pPr>
-          </a:lstStyle>
-          <a:p>
-            <a:pPr lvl="0"/>
-            <a:r>
-              <a:rPr lang="en-US"/>
-              <a:t>Click to edit Master text styles</a:t>
-            </a:r>
-          </a:p>
-        </p:txBody>
-      </p:sp>
       <p:cxnSp>
         <p:nvCxnSpPr>
           <p:cNvPr id="56" name="Straight Connector 55">
@@ -3410,7 +3261,7 @@
         </p:nvCxnSpPr>
         <p:spPr>
           <a:xfrm>
-            <a:off x="208876" y="2002727"/>
+            <a:off x="238128" y="1834557"/>
             <a:ext cx="6397070" cy="0"/>
           </a:xfrm>
           <a:prstGeom prst="line">
@@ -3457,7 +3308,7 @@
         </p:nvSpPr>
         <p:spPr>
           <a:xfrm>
-            <a:off x="914400" y="365760"/>
+            <a:off x="915714" y="595760"/>
             <a:ext cx="5715000" cy="457200"/>
           </a:xfrm>
         </p:spPr>
@@ -3488,7 +3339,7 @@
         </p:nvCxnSpPr>
         <p:spPr>
           <a:xfrm>
-            <a:off x="215267" y="2520323"/>
+            <a:off x="215267" y="2720015"/>
             <a:ext cx="6406123" cy="0"/>
           </a:xfrm>
           <a:prstGeom prst="line">
@@ -3531,7 +3382,7 @@
         </p:nvSpPr>
         <p:spPr>
           <a:xfrm>
-            <a:off x="218240" y="1189310"/>
+            <a:off x="238128" y="1988235"/>
             <a:ext cx="939296" cy="215444"/>
           </a:xfrm>
           <a:prstGeom prst="rect">
@@ -3566,8 +3417,8 @@
         </p:nvSpPr>
         <p:spPr>
           <a:xfrm>
-            <a:off x="215477" y="1560358"/>
-            <a:ext cx="499496" cy="215444"/>
+            <a:off x="253885" y="1381800"/>
+            <a:ext cx="561436" cy="246221"/>
           </a:xfrm>
           <a:prstGeom prst="rect">
             <a:avLst/>
@@ -3581,8 +3432,12 @@
           <a:lstStyle/>
           <a:p>
             <a:r>
+              <a:rPr lang="en-US" sz="1600" dirty="0"/>
+              <a:t>Status</a:t>
+            </a:r>
+            <a:r>
               <a:rPr lang="en-US" sz="1400" dirty="0"/>
-              <a:t>Status:</a:t>
+              <a:t>:</a:t>
             </a:r>
           </a:p>
         </p:txBody>
@@ -3605,8 +3460,8 @@
         </p:nvSpPr>
         <p:spPr>
           <a:xfrm>
-            <a:off x="1247538" y="1158126"/>
-            <a:ext cx="2061676" cy="277812"/>
+            <a:off x="1285946" y="1957051"/>
+            <a:ext cx="2064176" cy="277812"/>
           </a:xfrm>
           <a:ln>
             <a:solidFill>
@@ -3653,8 +3508,96 @@
         </p:nvSpPr>
         <p:spPr>
           <a:xfrm>
-            <a:off x="1247538" y="1529174"/>
-            <a:ext cx="2061676" cy="277812"/>
+            <a:off x="1285945" y="1361126"/>
+            <a:ext cx="2697475" cy="277812"/>
+          </a:xfrm>
+          <a:ln>
+            <a:noFill/>
+          </a:ln>
+        </p:spPr>
+        <p:txBody>
+          <a:bodyPr anchor="ctr">
+            <a:noAutofit/>
+          </a:bodyPr>
+          <a:lstStyle>
+            <a:lvl1pPr marL="0" indent="0" algn="l">
+              <a:buNone/>
+              <a:defRPr sz="1600"/>
+            </a:lvl1pPr>
+          </a:lstStyle>
+          <a:p>
+            <a:pPr lvl="0"/>
+            <a:r>
+              <a:rPr lang="en-US" dirty="0"/>
+              <a:t>Click to edit Master text styles</a:t>
+            </a:r>
+          </a:p>
+        </p:txBody>
+      </p:sp>
+      <p:sp>
+        <p:nvSpPr>
+          <p:cNvPr id="45" name="Text Placeholder 12">
+            <a:extLst>
+              <a:ext uri="{FF2B5EF4-FFF2-40B4-BE49-F238E27FC236}">
+                <a16:creationId xmlns:a16="http://schemas.microsoft.com/office/drawing/2014/main" id="{A101ECDD-D62D-B942-AC19-FFB6521144C7}"/>
+              </a:ext>
+            </a:extLst>
+          </p:cNvPr>
+          <p:cNvSpPr>
+            <a:spLocks noGrp="1"/>
+          </p:cNvSpPr>
+          <p:nvPr>
+            <p:ph type="body" sz="quarter" idx="27"/>
+          </p:nvPr>
+        </p:nvSpPr>
+        <p:spPr>
+          <a:xfrm>
+            <a:off x="4917057" y="0"/>
+            <a:ext cx="1940377" cy="150759"/>
+          </a:xfrm>
+          <a:ln>
+            <a:noFill/>
+          </a:ln>
+        </p:spPr>
+        <p:txBody>
+          <a:bodyPr lIns="0" tIns="365760" rIns="0" bIns="365760" anchor="ctr">
+            <a:noAutofit/>
+          </a:bodyPr>
+          <a:lstStyle>
+            <a:lvl1pPr marL="0" indent="0" algn="r">
+              <a:buNone/>
+              <a:defRPr sz="1200"/>
+            </a:lvl1pPr>
+          </a:lstStyle>
+          <a:p>
+            <a:pPr lvl="0"/>
+            <a:r>
+              <a:rPr lang="en-US" dirty="0"/>
+              <a:t>Click to edit Master text styles</a:t>
+            </a:r>
+          </a:p>
+        </p:txBody>
+      </p:sp>
+      <p:sp>
+        <p:nvSpPr>
+          <p:cNvPr id="46" name="Content Placeholder 2">
+            <a:extLst>
+              <a:ext uri="{FF2B5EF4-FFF2-40B4-BE49-F238E27FC236}">
+                <a16:creationId xmlns:a16="http://schemas.microsoft.com/office/drawing/2014/main" id="{2138F707-89E5-E74E-85B8-6A402D79B4F6}"/>
+              </a:ext>
+            </a:extLst>
+          </p:cNvPr>
+          <p:cNvSpPr>
+            <a:spLocks noGrp="1"/>
+          </p:cNvSpPr>
+          <p:nvPr>
+            <p:ph idx="28"/>
+          </p:nvPr>
+        </p:nvSpPr>
+        <p:spPr>
+          <a:xfrm>
+            <a:off x="223198" y="6253821"/>
+            <a:ext cx="6377425" cy="2286000"/>
           </a:xfrm>
           <a:ln>
             <a:solidFill>
@@ -3665,30 +3608,146 @@
           </a:ln>
         </p:spPr>
         <p:txBody>
-          <a:bodyPr anchor="ctr">
+          <a:bodyPr>
+            <a:normAutofit/>
+          </a:bodyPr>
+          <a:lstStyle>
+            <a:lvl1pPr marL="0" indent="0">
+              <a:buNone/>
+              <a:defRPr sz="1100"/>
+            </a:lvl1pPr>
+            <a:lvl2pPr marL="342900" indent="0">
+              <a:buNone/>
+              <a:defRPr sz="1100"/>
+            </a:lvl2pPr>
+            <a:lvl3pPr marL="685800" indent="0">
+              <a:buNone/>
+              <a:defRPr sz="1100"/>
+            </a:lvl3pPr>
+            <a:lvl4pPr marL="1028700" indent="0">
+              <a:buNone/>
+              <a:defRPr sz="1100"/>
+            </a:lvl4pPr>
+            <a:lvl5pPr marL="1371600" indent="0">
+              <a:buNone/>
+              <a:defRPr sz="1100"/>
+            </a:lvl5pPr>
+          </a:lstStyle>
+          <a:p>
+            <a:pPr lvl="0"/>
+            <a:r>
+              <a:rPr lang="en-US" dirty="0"/>
+              <a:t>Click to edit Master text styles</a:t>
+            </a:r>
+          </a:p>
+          <a:p>
+            <a:pPr lvl="1"/>
+            <a:r>
+              <a:rPr lang="en-US" dirty="0"/>
+              <a:t>Second level</a:t>
+            </a:r>
+          </a:p>
+          <a:p>
+            <a:pPr lvl="2"/>
+            <a:r>
+              <a:rPr lang="en-US" dirty="0"/>
+              <a:t>Third level</a:t>
+            </a:r>
+          </a:p>
+          <a:p>
+            <a:pPr lvl="3"/>
+            <a:r>
+              <a:rPr lang="en-US" dirty="0"/>
+              <a:t>Fourth level</a:t>
+            </a:r>
+          </a:p>
+          <a:p>
+            <a:pPr lvl="4"/>
+            <a:r>
+              <a:rPr lang="en-US" dirty="0"/>
+              <a:t>Fifth level</a:t>
+            </a:r>
+          </a:p>
+        </p:txBody>
+      </p:sp>
+      <p:sp>
+        <p:nvSpPr>
+          <p:cNvPr id="51" name="TextBox 50">
+            <a:extLst>
+              <a:ext uri="{FF2B5EF4-FFF2-40B4-BE49-F238E27FC236}">
+                <a16:creationId xmlns:a16="http://schemas.microsoft.com/office/drawing/2014/main" id="{9858558E-AB96-B945-90D5-03AE9DB022D4}"/>
+              </a:ext>
+            </a:extLst>
+          </p:cNvPr>
+          <p:cNvSpPr txBox="1"/>
+          <p:nvPr userDrawn="1"/>
+        </p:nvSpPr>
+        <p:spPr>
+          <a:xfrm>
+            <a:off x="204806" y="2979474"/>
+            <a:ext cx="3108960" cy="229668"/>
+          </a:xfrm>
+          <a:prstGeom prst="rect">
+            <a:avLst/>
+          </a:prstGeom>
+          <a:noFill/>
+        </p:spPr>
+        <p:txBody>
+          <a:bodyPr wrap="none" lIns="0" tIns="0" rIns="0" bIns="0" rtlCol="0">
             <a:noAutofit/>
           </a:bodyPr>
-          <a:lstStyle>
-            <a:lvl1pPr marL="0" indent="0" algn="l">
-              <a:buNone/>
-              <a:defRPr sz="1200"/>
-            </a:lvl1pPr>
-          </a:lstStyle>
-          <a:p>
-            <a:pPr lvl="0"/>
-            <a:r>
-              <a:rPr lang="en-US"/>
-              <a:t>Click to edit Master text styles</a:t>
-            </a:r>
-          </a:p>
-        </p:txBody>
-      </p:sp>
-      <p:sp>
-        <p:nvSpPr>
-          <p:cNvPr id="45" name="Text Placeholder 12">
-            <a:extLst>
-              <a:ext uri="{FF2B5EF4-FFF2-40B4-BE49-F238E27FC236}">
-                <a16:creationId xmlns:a16="http://schemas.microsoft.com/office/drawing/2014/main" id="{A101ECDD-D62D-B942-AC19-FFB6521144C7}"/>
+          <a:lstStyle/>
+          <a:p>
+            <a:r>
+              <a:rPr lang="en-US" sz="2000" dirty="0"/>
+              <a:t>Project Description</a:t>
+            </a:r>
+            <a:endParaRPr lang="en-US" sz="1400" dirty="0"/>
+          </a:p>
+        </p:txBody>
+      </p:sp>
+      <p:sp>
+        <p:nvSpPr>
+          <p:cNvPr id="41" name="TextBox 40">
+            <a:extLst>
+              <a:ext uri="{FF2B5EF4-FFF2-40B4-BE49-F238E27FC236}">
+                <a16:creationId xmlns:a16="http://schemas.microsoft.com/office/drawing/2014/main" id="{5D9B4F82-2C4C-224A-8E59-07210D87E094}"/>
+              </a:ext>
+            </a:extLst>
+          </p:cNvPr>
+          <p:cNvSpPr txBox="1"/>
+          <p:nvPr userDrawn="1"/>
+        </p:nvSpPr>
+        <p:spPr>
+          <a:xfrm>
+            <a:off x="204806" y="5873844"/>
+            <a:ext cx="3108960" cy="229668"/>
+          </a:xfrm>
+          <a:prstGeom prst="rect">
+            <a:avLst/>
+          </a:prstGeom>
+          <a:noFill/>
+        </p:spPr>
+        <p:txBody>
+          <a:bodyPr wrap="none" lIns="0" tIns="0" rIns="0" bIns="0" rtlCol="0">
+            <a:noAutofit/>
+          </a:bodyPr>
+          <a:lstStyle/>
+          <a:p>
+            <a:r>
+              <a:rPr lang="en-US" sz="2000" dirty="0"/>
+              <a:t>Project Benefits</a:t>
+            </a:r>
+            <a:endParaRPr lang="en-US" sz="1400" dirty="0"/>
+          </a:p>
+        </p:txBody>
+      </p:sp>
+      <p:sp>
+        <p:nvSpPr>
+          <p:cNvPr id="28" name="Text Placeholder 12">
+            <a:extLst>
+              <a:ext uri="{FF2B5EF4-FFF2-40B4-BE49-F238E27FC236}">
+                <a16:creationId xmlns:a16="http://schemas.microsoft.com/office/drawing/2014/main" id="{CF7D7492-6146-B24B-9351-AC7D8939B662}"/>
               </a:ext>
             </a:extLst>
           </p:cNvPr>
@@ -3696,43 +3755,47 @@
             <a:spLocks noGrp="1"/>
           </p:cNvSpPr>
           <p:nvPr>
-            <p:ph type="body" sz="quarter" idx="27"/>
+            <p:ph type="body" sz="quarter" idx="29" hasCustomPrompt="1"/>
           </p:nvPr>
         </p:nvSpPr>
         <p:spPr>
           <a:xfrm>
-            <a:off x="3772465" y="0"/>
-            <a:ext cx="3084969" cy="155121"/>
+            <a:off x="2404575" y="-2306"/>
+            <a:ext cx="2064175" cy="277812"/>
           </a:xfrm>
           <a:ln>
             <a:noFill/>
           </a:ln>
         </p:spPr>
         <p:txBody>
-          <a:bodyPr lIns="0" tIns="365760" rIns="0" bIns="365760" anchor="ctr">
+          <a:bodyPr anchor="ctr">
             <a:noAutofit/>
           </a:bodyPr>
           <a:lstStyle>
-            <a:lvl1pPr marL="0" indent="0" algn="r">
-              <a:buNone/>
-              <a:defRPr sz="1200"/>
+            <a:lvl1pPr marL="0" indent="0" algn="ctr">
+              <a:buNone/>
+              <a:defRPr sz="2000">
+                <a:solidFill>
+                  <a:srgbClr val="FF0000"/>
+                </a:solidFill>
+              </a:defRPr>
             </a:lvl1pPr>
           </a:lstStyle>
           <a:p>
             <a:pPr lvl="0"/>
             <a:r>
               <a:rPr lang="en-US" dirty="0"/>
-              <a:t>Click to edit Master text styles</a:t>
-            </a:r>
-          </a:p>
-        </p:txBody>
-      </p:sp>
-      <p:sp>
-        <p:nvSpPr>
-          <p:cNvPr id="46" name="Content Placeholder 2">
-            <a:extLst>
-              <a:ext uri="{FF2B5EF4-FFF2-40B4-BE49-F238E27FC236}">
-                <a16:creationId xmlns:a16="http://schemas.microsoft.com/office/drawing/2014/main" id="{2138F707-89E5-E74E-85B8-6A402D79B4F6}"/>
+              <a:t>Compliance</a:t>
+            </a:r>
+          </a:p>
+        </p:txBody>
+      </p:sp>
+      <p:sp>
+        <p:nvSpPr>
+          <p:cNvPr id="30" name="Text Placeholder 12">
+            <a:extLst>
+              <a:ext uri="{FF2B5EF4-FFF2-40B4-BE49-F238E27FC236}">
+                <a16:creationId xmlns:a16="http://schemas.microsoft.com/office/drawing/2014/main" id="{D3651AED-2517-4442-8DCE-C084F4457166}"/>
               </a:ext>
             </a:extLst>
           </p:cNvPr>
@@ -3740,157 +3803,71 @@
             <a:spLocks noGrp="1"/>
           </p:cNvSpPr>
           <p:nvPr>
-            <p:ph idx="28"/>
+            <p:ph type="body" sz="quarter" idx="30" hasCustomPrompt="1"/>
           </p:nvPr>
         </p:nvSpPr>
         <p:spPr>
           <a:xfrm>
-            <a:off x="223198" y="6253821"/>
-            <a:ext cx="6377425" cy="2286000"/>
+            <a:off x="2404575" y="8862804"/>
+            <a:ext cx="2064175" cy="277812"/>
           </a:xfrm>
           <a:ln>
-            <a:solidFill>
-              <a:schemeClr val="bg2">
-                <a:lumMod val="90000"/>
-              </a:schemeClr>
-            </a:solidFill>
+            <a:noFill/>
           </a:ln>
         </p:spPr>
         <p:txBody>
-          <a:bodyPr>
-            <a:normAutofit/>
+          <a:bodyPr anchor="ctr">
+            <a:noAutofit/>
           </a:bodyPr>
           <a:lstStyle>
-            <a:lvl1pPr marL="0" indent="0">
-              <a:buNone/>
-              <a:defRPr sz="1100"/>
+            <a:lvl1pPr marL="0" indent="0" algn="ctr">
+              <a:buNone/>
+              <a:defRPr sz="2000">
+                <a:solidFill>
+                  <a:srgbClr val="FF0000"/>
+                </a:solidFill>
+              </a:defRPr>
             </a:lvl1pPr>
-            <a:lvl2pPr marL="342900" indent="0">
-              <a:buNone/>
-              <a:defRPr sz="1100"/>
-            </a:lvl2pPr>
-            <a:lvl3pPr marL="685800" indent="0">
-              <a:buNone/>
-              <a:defRPr sz="1100"/>
-            </a:lvl3pPr>
-            <a:lvl4pPr marL="1028700" indent="0">
-              <a:buNone/>
-              <a:defRPr sz="1100"/>
-            </a:lvl4pPr>
-            <a:lvl5pPr marL="1371600" indent="0">
-              <a:buNone/>
-              <a:defRPr sz="1100"/>
-            </a:lvl5pPr>
           </a:lstStyle>
           <a:p>
             <a:pPr lvl="0"/>
             <a:r>
               <a:rPr lang="en-US" dirty="0"/>
-              <a:t>Click to edit Master text styles</a:t>
-            </a:r>
-          </a:p>
-          <a:p>
-            <a:pPr lvl="1"/>
-            <a:r>
-              <a:rPr lang="en-US" dirty="0"/>
-              <a:t>Second level</a:t>
-            </a:r>
-          </a:p>
-          <a:p>
-            <a:pPr lvl="2"/>
-            <a:r>
-              <a:rPr lang="en-US" dirty="0"/>
-              <a:t>Third level</a:t>
-            </a:r>
-          </a:p>
-          <a:p>
-            <a:pPr lvl="3"/>
-            <a:r>
-              <a:rPr lang="en-US" dirty="0"/>
-              <a:t>Fourth level</a:t>
-            </a:r>
-          </a:p>
-          <a:p>
-            <a:pPr lvl="4"/>
-            <a:r>
-              <a:rPr lang="en-US" dirty="0"/>
-              <a:t>Fifth level</a:t>
-            </a:r>
-          </a:p>
-        </p:txBody>
-      </p:sp>
-      <p:sp>
-        <p:nvSpPr>
-          <p:cNvPr id="51" name="TextBox 50">
-            <a:extLst>
-              <a:ext uri="{FF2B5EF4-FFF2-40B4-BE49-F238E27FC236}">
-                <a16:creationId xmlns:a16="http://schemas.microsoft.com/office/drawing/2014/main" id="{9858558E-AB96-B945-90D5-03AE9DB022D4}"/>
-              </a:ext>
-            </a:extLst>
-          </p:cNvPr>
-          <p:cNvSpPr txBox="1"/>
+              <a:t>Compliance</a:t>
+            </a:r>
+          </a:p>
+        </p:txBody>
+      </p:sp>
+      <p:pic>
+        <p:nvPicPr>
+          <p:cNvPr id="37" name="Picture 36" descr="A picture containing vector graphics&#10;&#10;Description automatically generated">
+            <a:extLst>
+              <a:ext uri="{FF2B5EF4-FFF2-40B4-BE49-F238E27FC236}">
+                <a16:creationId xmlns:a16="http://schemas.microsoft.com/office/drawing/2014/main" id="{9F50AC91-32B7-9049-BBB2-34937212A949}"/>
+              </a:ext>
+            </a:extLst>
+          </p:cNvPr>
+          <p:cNvPicPr>
+            <a:picLocks noChangeAspect="1"/>
+          </p:cNvPicPr>
           <p:nvPr userDrawn="1"/>
-        </p:nvSpPr>
-        <p:spPr>
-          <a:xfrm>
-            <a:off x="204806" y="2853354"/>
-            <a:ext cx="3108960" cy="229668"/>
+        </p:nvPicPr>
+        <p:blipFill>
+          <a:blip r:embed="rId2"/>
+          <a:stretch>
+            <a:fillRect/>
+          </a:stretch>
+        </p:blipFill>
+        <p:spPr>
+          <a:xfrm>
+            <a:off x="223198" y="594824"/>
+            <a:ext cx="457200" cy="457200"/>
           </a:xfrm>
           <a:prstGeom prst="rect">
             <a:avLst/>
           </a:prstGeom>
-          <a:noFill/>
-        </p:spPr>
-        <p:txBody>
-          <a:bodyPr wrap="none" lIns="0" tIns="0" rIns="0" bIns="0" rtlCol="0">
-            <a:noAutofit/>
-          </a:bodyPr>
-          <a:lstStyle/>
-          <a:p>
-            <a:r>
-              <a:rPr lang="en-US" sz="2000" dirty="0"/>
-              <a:t>Project Description</a:t>
-            </a:r>
-            <a:endParaRPr lang="en-US" sz="1400" dirty="0"/>
-          </a:p>
-        </p:txBody>
-      </p:sp>
-      <p:sp>
-        <p:nvSpPr>
-          <p:cNvPr id="41" name="TextBox 40">
-            <a:extLst>
-              <a:ext uri="{FF2B5EF4-FFF2-40B4-BE49-F238E27FC236}">
-                <a16:creationId xmlns:a16="http://schemas.microsoft.com/office/drawing/2014/main" id="{5D9B4F82-2C4C-224A-8E59-07210D87E094}"/>
-              </a:ext>
-            </a:extLst>
-          </p:cNvPr>
-          <p:cNvSpPr txBox="1"/>
-          <p:nvPr userDrawn="1"/>
-        </p:nvSpPr>
-        <p:spPr>
-          <a:xfrm>
-            <a:off x="204806" y="5873844"/>
-            <a:ext cx="3108960" cy="229668"/>
-          </a:xfrm>
-          <a:prstGeom prst="rect">
-            <a:avLst/>
-          </a:prstGeom>
-          <a:noFill/>
-        </p:spPr>
-        <p:txBody>
-          <a:bodyPr wrap="none" lIns="0" tIns="0" rIns="0" bIns="0" rtlCol="0">
-            <a:noAutofit/>
-          </a:bodyPr>
-          <a:lstStyle/>
-          <a:p>
-            <a:r>
-              <a:rPr lang="en-US" sz="2000" dirty="0"/>
-              <a:t>Project Benefits</a:t>
-            </a:r>
-            <a:endParaRPr lang="en-US" sz="1400" dirty="0"/>
-          </a:p>
-        </p:txBody>
-      </p:sp>
+        </p:spPr>
+      </p:pic>
     </p:spTree>
     <p:extLst>
       <p:ext uri="{BB962C8B-B14F-4D97-AF65-F5344CB8AC3E}">
@@ -4085,7 +4062,7 @@
           <a:p>
             <a:fld id="{0DAB70E3-47D6-2842-9376-028C836601F0}" type="datetimeFigureOut">
               <a:rPr lang="en-US" smtClean="0"/>
-              <a:t>12/4/19</a:t>
+              <a:t>12/19/19</a:t>
             </a:fld>
             <a:endParaRPr lang="en-US"/>
           </a:p>

</xml_diff>

<commit_message>
Updated the request template to include compliance flags.
</commit_message>
<xml_diff>
--- a/project_request_template.pptx
+++ b/project_request_template.pptx
@@ -3503,12 +3503,12 @@
             <a:spLocks noGrp="1"/>
           </p:cNvSpPr>
           <p:nvPr>
-            <p:ph type="body" sz="quarter" idx="24"/>
+            <p:ph type="body" sz="quarter" idx="24" hasCustomPrompt="1"/>
           </p:nvPr>
         </p:nvSpPr>
         <p:spPr>
           <a:xfrm>
-            <a:off x="1285945" y="1361126"/>
+            <a:off x="1285945" y="1382558"/>
             <a:ext cx="2697475" cy="277812"/>
           </a:xfrm>
           <a:ln>
@@ -3529,7 +3529,7 @@
             <a:pPr lvl="0"/>
             <a:r>
               <a:rPr lang="en-US" dirty="0"/>
-              <a:t>Click to edit Master text styles</a:t>
+              <a:t>This is a status</a:t>
             </a:r>
           </a:p>
         </p:txBody>
@@ -3755,7 +3755,7 @@
             <a:spLocks noGrp="1"/>
           </p:cNvSpPr>
           <p:nvPr>
-            <p:ph type="body" sz="quarter" idx="29" hasCustomPrompt="1"/>
+            <p:ph type="body" sz="quarter" idx="29"/>
           </p:nvPr>
         </p:nvSpPr>
         <p:spPr>
@@ -3783,10 +3783,7 @@
           </a:lstStyle>
           <a:p>
             <a:pPr lvl="0"/>
-            <a:r>
-              <a:rPr lang="en-US" dirty="0"/>
-              <a:t>Compliance</a:t>
-            </a:r>
+            <a:endParaRPr lang="en-US" dirty="0"/>
           </a:p>
         </p:txBody>
       </p:sp>
@@ -3803,7 +3800,7 @@
             <a:spLocks noGrp="1"/>
           </p:cNvSpPr>
           <p:nvPr>
-            <p:ph type="body" sz="quarter" idx="30" hasCustomPrompt="1"/>
+            <p:ph type="body" sz="quarter" idx="30"/>
           </p:nvPr>
         </p:nvSpPr>
         <p:spPr>
@@ -3831,10 +3828,7 @@
           </a:lstStyle>
           <a:p>
             <a:pPr lvl="0"/>
-            <a:r>
-              <a:rPr lang="en-US" dirty="0"/>
-              <a:t>Compliance</a:t>
-            </a:r>
+            <a:endParaRPr lang="en-US" dirty="0"/>
           </a:p>
         </p:txBody>
       </p:sp>

</xml_diff>